<commit_message>
Ajustes na estrutura, repositório e configurações
</commit_message>
<xml_diff>
--- a/Entregaveis/Atividade 2.pptx
+++ b/Entregaveis/Atividade 2.pptx
@@ -6,8 +6,8 @@
   </p:sldMasterIdLst>
   <p:sldIdLst>
     <p:sldId id="256" r:id="rId2"/>
-    <p:sldId id="257" r:id="rId3"/>
-    <p:sldId id="258" r:id="rId4"/>
+    <p:sldId id="258" r:id="rId3"/>
+    <p:sldId id="257" r:id="rId4"/>
     <p:sldId id="259" r:id="rId5"/>
     <p:sldId id="260" r:id="rId6"/>
     <p:sldId id="262" r:id="rId7"/>
@@ -303,7 +303,7 @@
             <a:fld id="{87DE6118-2437-4B30-8E3C-4D2BE6020583}" type="datetimeFigureOut">
               <a:rPr lang="en-US" dirty="0"/>
               <a:pPr/>
-              <a:t>9/12/2025</a:t>
+              <a:t>9/15/2025</a:t>
             </a:fld>
             <a:endParaRPr lang="en-US" dirty="0"/>
           </a:p>
@@ -629,7 +629,7 @@
           <a:p>
             <a:fld id="{87DE6118-2437-4B30-8E3C-4D2BE6020583}" type="datetimeFigureOut">
               <a:rPr lang="en-US" dirty="0"/>
-              <a:t>9/12/2025</a:t>
+              <a:t>9/15/2025</a:t>
             </a:fld>
             <a:endParaRPr lang="en-US" dirty="0"/>
           </a:p>
@@ -804,7 +804,7 @@
           <a:p>
             <a:fld id="{87DE6118-2437-4B30-8E3C-4D2BE6020583}" type="datetimeFigureOut">
               <a:rPr lang="en-US" dirty="0"/>
-              <a:t>9/12/2025</a:t>
+              <a:t>9/15/2025</a:t>
             </a:fld>
             <a:endParaRPr lang="en-US" dirty="0"/>
           </a:p>
@@ -969,7 +969,7 @@
           <a:p>
             <a:fld id="{87DE6118-2437-4B30-8E3C-4D2BE6020583}" type="datetimeFigureOut">
               <a:rPr lang="en-US" dirty="0"/>
-              <a:t>9/12/2025</a:t>
+              <a:t>9/15/2025</a:t>
             </a:fld>
             <a:endParaRPr lang="en-US" dirty="0"/>
           </a:p>
@@ -1242,7 +1242,7 @@
             <a:fld id="{87DE6118-2437-4B30-8E3C-4D2BE6020583}" type="datetimeFigureOut">
               <a:rPr lang="en-US" dirty="0"/>
               <a:pPr/>
-              <a:t>9/12/2025</a:t>
+              <a:t>9/15/2025</a:t>
             </a:fld>
             <a:endParaRPr lang="en-US" dirty="0"/>
           </a:p>
@@ -1632,7 +1632,7 @@
           <a:p>
             <a:fld id="{87DE6118-2437-4B30-8E3C-4D2BE6020583}" type="datetimeFigureOut">
               <a:rPr lang="en-US" dirty="0"/>
-              <a:t>9/12/2025</a:t>
+              <a:t>9/15/2025</a:t>
             </a:fld>
             <a:endParaRPr lang="en-US" dirty="0"/>
           </a:p>
@@ -2104,7 +2104,7 @@
           <a:p>
             <a:fld id="{87DE6118-2437-4B30-8E3C-4D2BE6020583}" type="datetimeFigureOut">
               <a:rPr lang="en-US" dirty="0"/>
-              <a:t>9/12/2025</a:t>
+              <a:t>9/15/2025</a:t>
             </a:fld>
             <a:endParaRPr lang="en-US" dirty="0"/>
           </a:p>
@@ -2217,7 +2217,7 @@
           <a:p>
             <a:fld id="{87DE6118-2437-4B30-8E3C-4D2BE6020583}" type="datetimeFigureOut">
               <a:rPr lang="en-US" dirty="0"/>
-              <a:t>9/12/2025</a:t>
+              <a:t>9/15/2025</a:t>
             </a:fld>
             <a:endParaRPr lang="en-US" dirty="0"/>
           </a:p>
@@ -2307,7 +2307,7 @@
           <a:p>
             <a:fld id="{87DE6118-2437-4B30-8E3C-4D2BE6020583}" type="datetimeFigureOut">
               <a:rPr lang="en-US" dirty="0"/>
-              <a:t>9/12/2025</a:t>
+              <a:t>9/15/2025</a:t>
             </a:fld>
             <a:endParaRPr lang="en-US" dirty="0"/>
           </a:p>
@@ -2649,7 +2649,7 @@
             <a:fld id="{87DE6118-2437-4B30-8E3C-4D2BE6020583}" type="datetimeFigureOut">
               <a:rPr lang="en-US" dirty="0"/>
               <a:pPr/>
-              <a:t>9/12/2025</a:t>
+              <a:t>9/15/2025</a:t>
             </a:fld>
             <a:endParaRPr lang="en-US" dirty="0"/>
           </a:p>
@@ -3034,7 +3034,7 @@
             <a:fld id="{87DE6118-2437-4B30-8E3C-4D2BE6020583}" type="datetimeFigureOut">
               <a:rPr lang="en-US" dirty="0"/>
               <a:pPr/>
-              <a:t>9/12/2025</a:t>
+              <a:t>9/15/2025</a:t>
             </a:fld>
             <a:endParaRPr lang="en-US" dirty="0"/>
           </a:p>
@@ -3309,7 +3309,7 @@
             <a:fld id="{87DE6118-2437-4B30-8E3C-4D2BE6020583}" type="datetimeFigureOut">
               <a:rPr lang="en-US" dirty="0"/>
               <a:pPr/>
-              <a:t>9/12/2025</a:t>
+              <a:t>9/15/2025</a:t>
             </a:fld>
             <a:endParaRPr lang="en-US" dirty="0"/>
           </a:p>
@@ -3840,7 +3840,7 @@
           <a:p>
             <a:r>
               <a:rPr lang="pt-BR" dirty="0"/>
-              <a:t>Prática 01</a:t>
+              <a:t>Prática 02</a:t>
             </a:r>
           </a:p>
         </p:txBody>
@@ -3870,15 +3870,22 @@
           <a:p>
             <a:pPr fontAlgn="ctr" latinLnBrk="0"/>
             <a:r>
-              <a:rPr lang="pt-BR" b="1" dirty="0">
-                <a:solidFill>
-                  <a:srgbClr val="0A0A0A"/>
-                </a:solidFill>
-                <a:effectLst/>
-                <a:latin typeface="Nunito" panose="020B0604020202020204" pitchFamily="2" charset="0"/>
-              </a:rPr>
-              <a:t>Configuração do Ambiente Spring Boot para Projeto Delivery</a:t>
-            </a:r>
+              <a:rPr lang="pt-BR" b="0" i="0" dirty="0">
+                <a:solidFill>
+                  <a:srgbClr val="6F7074"/>
+                </a:solidFill>
+                <a:effectLst/>
+                <a:latin typeface="Roboto" panose="02000000000000000000" pitchFamily="2" charset="0"/>
+              </a:rPr>
+              <a:t>Pensar e Responder 2 – Arquitetura de Sistemas</a:t>
+            </a:r>
+            <a:endParaRPr lang="pt-BR" b="1" dirty="0">
+              <a:solidFill>
+                <a:srgbClr val="0A0A0A"/>
+              </a:solidFill>
+              <a:effectLst/>
+              <a:latin typeface="Nunito" panose="020B0604020202020204" pitchFamily="2" charset="0"/>
+            </a:endParaRPr>
           </a:p>
         </p:txBody>
       </p:sp>
@@ -4303,7 +4310,7 @@
           <a:graphicData uri="http://schemas.openxmlformats.org/presentationml/2006/ole">
             <mc:AlternateContent xmlns:mc="http://schemas.openxmlformats.org/markup-compatibility/2006">
               <mc:Choice xmlns:v="urn:schemas-microsoft-com:vml" Requires="v">
-                <p:oleObj spid="_x0000_s3077" name="Objeto de Shell de Gerenciador" showAsIcon="1" r:id="rId3" imgW="809708" imgH="514326" progId="Package">
+                <p:oleObj spid="_x0000_s3081" name="Objeto de Shell de Gerenciador" showAsIcon="1" r:id="rId3" imgW="809708" imgH="514326" progId="Package">
                   <p:embed/>
                 </p:oleObj>
               </mc:Choice>
@@ -4528,7 +4535,7 @@
           <a:graphicData uri="http://schemas.openxmlformats.org/presentationml/2006/ole">
             <mc:AlternateContent xmlns:mc="http://schemas.openxmlformats.org/markup-compatibility/2006">
               <mc:Choice xmlns:v="urn:schemas-microsoft-com:vml" Requires="v">
-                <p:oleObj spid="_x0000_s2053" name="Objeto de Shell de Gerenciador" showAsIcon="1" r:id="rId3" imgW="1381068" imgH="514326" progId="Package">
+                <p:oleObj spid="_x0000_s2057" name="Objeto de Shell de Gerenciador" showAsIcon="1" r:id="rId3" imgW="1381068" imgH="514326" progId="Package">
                   <p:embed/>
                 </p:oleObj>
               </mc:Choice>
@@ -5297,7 +5304,7 @@
           <a:graphicData uri="http://schemas.openxmlformats.org/presentationml/2006/ole">
             <mc:AlternateContent xmlns:mc="http://schemas.openxmlformats.org/markup-compatibility/2006">
               <mc:Choice xmlns:v="urn:schemas-microsoft-com:vml" Requires="v">
-                <p:oleObj spid="_x0000_s7173" name="Objeto de Shell de Gerenciador" showAsIcon="1" r:id="rId3" imgW="1342977" imgH="514326" progId="Package">
+                <p:oleObj spid="_x0000_s7177" name="Objeto de Shell de Gerenciador" showAsIcon="1" r:id="rId3" imgW="1342977" imgH="514326" progId="Package">
                   <p:embed/>
                 </p:oleObj>
               </mc:Choice>
@@ -5837,7 +5844,7 @@
           <p:cNvPr id="2" name="Título 1">
             <a:extLst>
               <a:ext uri="{FF2B5EF4-FFF2-40B4-BE49-F238E27FC236}">
-                <a16:creationId xmlns:a16="http://schemas.microsoft.com/office/drawing/2014/main" id="{FF502F8C-65AF-4E04-A3F4-1434C67F4F1A}"/>
+                <a16:creationId xmlns:a16="http://schemas.microsoft.com/office/drawing/2014/main" id="{75D91476-E09F-453B-A9FA-255014BC325B}"/>
               </a:ext>
             </a:extLst>
           </p:cNvPr>
@@ -5850,31 +5857,41 @@
         </p:nvSpPr>
         <p:spPr/>
         <p:txBody>
-          <a:bodyPr>
+          <a:bodyPr vert="horz" lIns="91440" tIns="45720" rIns="91440" bIns="45720" rtlCol="0" anchor="t">
             <a:normAutofit/>
           </a:bodyPr>
           <a:lstStyle/>
           <a:p>
-            <a:r>
-              <a:rPr lang="pt-BR" b="1" i="0" dirty="0">
+            <a:br>
+              <a:rPr lang="pt-BR" sz="2800" b="1" dirty="0">
                 <a:solidFill>
                   <a:srgbClr val="0A0A0A"/>
                 </a:solidFill>
-                <a:effectLst/>
                 <a:latin typeface="Nunito" pitchFamily="2" charset="0"/>
               </a:rPr>
-              <a:t>🎯 Missão</a:t>
-            </a:r>
-            <a:endParaRPr lang="pt-BR" dirty="0"/>
-          </a:p>
-        </p:txBody>
-      </p:sp>
-      <p:sp>
-        <p:nvSpPr>
-          <p:cNvPr id="3" name="Espaço Reservado para Conteúdo 2">
+            </a:br>
+            <a:r>
+              <a:rPr lang="pt-BR" sz="2800" dirty="0"/>
+              <a:t>🧩</a:t>
+            </a:r>
+            <a:r>
+              <a:rPr lang="pt-BR" sz="2800" b="1" dirty="0">
+                <a:solidFill>
+                  <a:srgbClr val="0A0A0A"/>
+                </a:solidFill>
+                <a:latin typeface="Nunito" pitchFamily="2" charset="0"/>
+              </a:rPr>
+              <a:t> Modelo UML: Arquitetura em Camadas</a:t>
+            </a:r>
+          </a:p>
+        </p:txBody>
+      </p:sp>
+      <p:sp>
+        <p:nvSpPr>
+          <p:cNvPr id="4" name="Espaço Reservado para Conteúdo 3">
             <a:extLst>
               <a:ext uri="{FF2B5EF4-FFF2-40B4-BE49-F238E27FC236}">
-                <a16:creationId xmlns:a16="http://schemas.microsoft.com/office/drawing/2014/main" id="{363A532B-3F49-4A22-A8CF-0A4FFA21DC84}"/>
+                <a16:creationId xmlns:a16="http://schemas.microsoft.com/office/drawing/2014/main" id="{D5E87BA9-5D9E-4458-9D65-644F2365DEE5}"/>
               </a:ext>
             </a:extLst>
           </p:cNvPr>
@@ -5885,98 +5902,342 @@
             <p:ph idx="1"/>
           </p:nvPr>
         </p:nvSpPr>
-        <p:spPr/>
-        <p:txBody>
-          <a:bodyPr>
-            <a:normAutofit/>
+        <p:spPr>
+          <a:xfrm>
+            <a:off x="1371600" y="1638300"/>
+            <a:ext cx="9601200" cy="4338430"/>
+          </a:xfrm>
+        </p:spPr>
+        <p:txBody>
+          <a:bodyPr numCol="2">
+            <a:noAutofit/>
           </a:bodyPr>
           <a:lstStyle/>
           <a:p>
-            <a:pPr algn="l">
-              <a:buFont typeface="+mj-lt"/>
-              <a:buAutoNum type="arabicPeriod"/>
+            <a:pPr marL="0" indent="0">
+              <a:buNone/>
             </a:pPr>
             <a:r>
-              <a:rPr lang="pt-BR" sz="1800" b="0" i="0" dirty="0">
-                <a:solidFill>
-                  <a:srgbClr val="6F7074"/>
-                </a:solidFill>
-                <a:effectLst/>
-                <a:latin typeface="Roboto" panose="02000000000000000000" pitchFamily="2" charset="0"/>
-              </a:rPr>
-              <a:t>🏗️ Preparar o ambiente de desenvolvimento (como um arquiteto prepara o terreno)</a:t>
-            </a:r>
-          </a:p>
-          <a:p>
-            <a:pPr algn="l">
-              <a:buFont typeface="+mj-lt"/>
-              <a:buAutoNum type="arabicPeriod"/>
+              <a:rPr lang="pt-BR" sz="1050" dirty="0"/>
+              <a:t>+---------------------+</a:t>
+            </a:r>
+          </a:p>
+          <a:p>
+            <a:pPr marL="0" indent="0">
+              <a:buNone/>
             </a:pPr>
             <a:r>
-              <a:rPr lang="pt-BR" sz="1800" b="0" i="0" dirty="0">
-                <a:solidFill>
-                  <a:srgbClr val="6F7074"/>
-                </a:solidFill>
-                <a:effectLst/>
-                <a:latin typeface="Roboto" panose="02000000000000000000" pitchFamily="2" charset="0"/>
-              </a:rPr>
-              <a:t>🧱 Criar a estrutura base do projeto (como construir as fundações de um prédio)</a:t>
-            </a:r>
-          </a:p>
-          <a:p>
-            <a:pPr algn="l">
-              <a:buFont typeface="+mj-lt"/>
-              <a:buAutoNum type="arabicPeriod"/>
+              <a:rPr lang="pt-BR" sz="1200" dirty="0"/>
+              <a:t>|     </a:t>
+            </a:r>
+            <a:r>
+              <a:rPr lang="pt-BR" sz="1200" dirty="0" err="1"/>
+              <a:t>Controller</a:t>
+            </a:r>
+            <a:r>
+              <a:rPr lang="pt-BR" sz="1200" dirty="0"/>
+              <a:t>      |  ← Camada de Apresentação</a:t>
+            </a:r>
+          </a:p>
+          <a:p>
+            <a:pPr marL="0" indent="0">
+              <a:buNone/>
             </a:pPr>
             <a:r>
-              <a:rPr lang="pt-BR" sz="1800" b="0" i="0" dirty="0">
-                <a:solidFill>
-                  <a:srgbClr val="6F7074"/>
-                </a:solidFill>
-                <a:effectLst/>
-                <a:latin typeface="Roboto" panose="02000000000000000000" pitchFamily="2" charset="0"/>
-              </a:rPr>
-              <a:t>🔧 Configurar as ferramentas essenciais (como instalar a infraestrutura básica)</a:t>
-            </a:r>
-          </a:p>
-          <a:p>
-            <a:pPr algn="l">
-              <a:buFont typeface="+mj-lt"/>
-              <a:buAutoNum type="arabicPeriod"/>
+              <a:rPr lang="pt-BR" sz="1050" dirty="0"/>
+              <a:t>|---------------------|</a:t>
+            </a:r>
+          </a:p>
+          <a:p>
+            <a:pPr marL="0" indent="0">
+              <a:buNone/>
             </a:pPr>
             <a:r>
-              <a:rPr lang="pt-BR" sz="1800" b="0" i="0" dirty="0">
-                <a:solidFill>
-                  <a:srgbClr val="6F7074"/>
-                </a:solidFill>
-                <a:effectLst/>
-                <a:latin typeface="Roboto" panose="02000000000000000000" pitchFamily="2" charset="0"/>
-              </a:rPr>
-              <a:t>✅ Validar que tudo funciona (como fazer o primeiro teste de qualidade)</a:t>
-            </a:r>
-          </a:p>
-          <a:p>
-            <a:pPr algn="l">
-              <a:buFont typeface="+mj-lt"/>
-              <a:buAutoNum type="arabicPeriod"/>
+              <a:rPr lang="pt-BR" sz="1200" dirty="0"/>
+              <a:t>| - </a:t>
+            </a:r>
+            <a:r>
+              <a:rPr lang="pt-BR" sz="1200" dirty="0" err="1"/>
+              <a:t>ClienteController</a:t>
+            </a:r>
+            <a:r>
+              <a:rPr lang="pt-BR" sz="1200" dirty="0"/>
+              <a:t> |</a:t>
+            </a:r>
+          </a:p>
+          <a:p>
+            <a:pPr marL="0" indent="0">
+              <a:buNone/>
             </a:pPr>
             <a:r>
-              <a:rPr lang="pt-BR" sz="1800" b="0" i="0" dirty="0">
-                <a:solidFill>
-                  <a:srgbClr val="6F7074"/>
-                </a:solidFill>
-                <a:effectLst/>
-                <a:latin typeface="Roboto" panose="02000000000000000000" pitchFamily="2" charset="0"/>
-              </a:rPr>
-              <a:t>📚 Documentar o processo (para que outros desenvolvedores possam replicar)</a:t>
-            </a:r>
+              <a:rPr lang="pt-BR" sz="1200" dirty="0"/>
+              <a:t>| - </a:t>
+            </a:r>
+            <a:r>
+              <a:rPr lang="pt-BR" sz="1200" dirty="0" err="1"/>
+              <a:t>RestauranteController</a:t>
+            </a:r>
+            <a:r>
+              <a:rPr lang="pt-BR" sz="1200" dirty="0"/>
+              <a:t> |</a:t>
+            </a:r>
+          </a:p>
+          <a:p>
+            <a:pPr marL="0" indent="0">
+              <a:buNone/>
+            </a:pPr>
+            <a:r>
+              <a:rPr lang="pt-BR" sz="1050" dirty="0"/>
+              <a:t>+---------------------+</a:t>
+            </a:r>
+          </a:p>
+          <a:p>
+            <a:pPr marL="0" indent="0">
+              <a:buNone/>
+            </a:pPr>
+            <a:r>
+              <a:rPr lang="pt-BR" sz="1050" dirty="0"/>
+              <a:t>          ↓</a:t>
+            </a:r>
+          </a:p>
+          <a:p>
+            <a:pPr marL="0" indent="0">
+              <a:buNone/>
+            </a:pPr>
+            <a:r>
+              <a:rPr lang="pt-BR" sz="1050" dirty="0"/>
+              <a:t>+---------------------+</a:t>
+            </a:r>
+          </a:p>
+          <a:p>
+            <a:pPr marL="0" indent="0">
+              <a:buNone/>
+            </a:pPr>
+            <a:r>
+              <a:rPr lang="pt-BR" sz="1050" dirty="0"/>
+              <a:t>|      </a:t>
+            </a:r>
+            <a:r>
+              <a:rPr lang="pt-BR" sz="1200" dirty="0"/>
+              <a:t>Service        |  ← Camada de Negócio</a:t>
+            </a:r>
+            <a:endParaRPr lang="pt-BR" sz="1050" dirty="0"/>
+          </a:p>
+          <a:p>
+            <a:pPr marL="0" indent="0">
+              <a:buNone/>
+            </a:pPr>
+            <a:r>
+              <a:rPr lang="pt-BR" sz="1050" dirty="0"/>
+              <a:t>|---------------------|</a:t>
+            </a:r>
+          </a:p>
+          <a:p>
+            <a:pPr marL="0" indent="0">
+              <a:buNone/>
+            </a:pPr>
+            <a:r>
+              <a:rPr lang="pt-BR" sz="1200" dirty="0"/>
+              <a:t>| - </a:t>
+            </a:r>
+            <a:r>
+              <a:rPr lang="pt-BR" sz="1200" dirty="0" err="1"/>
+              <a:t>ClienteService</a:t>
+            </a:r>
+            <a:r>
+              <a:rPr lang="pt-BR" sz="1200" dirty="0"/>
+              <a:t>    |</a:t>
+            </a:r>
+          </a:p>
+          <a:p>
+            <a:pPr marL="0" indent="0">
+              <a:buNone/>
+            </a:pPr>
+            <a:r>
+              <a:rPr lang="pt-BR" sz="1200" dirty="0"/>
+              <a:t>| - </a:t>
+            </a:r>
+            <a:r>
+              <a:rPr lang="pt-BR" sz="1200" dirty="0" err="1"/>
+              <a:t>RestauranteService</a:t>
+            </a:r>
+            <a:r>
+              <a:rPr lang="pt-BR" sz="1200" dirty="0"/>
+              <a:t>|</a:t>
+            </a:r>
+          </a:p>
+          <a:p>
+            <a:pPr marL="0" indent="0">
+              <a:buNone/>
+            </a:pPr>
+            <a:r>
+              <a:rPr lang="pt-BR" sz="1050" dirty="0"/>
+              <a:t>+---------------------+</a:t>
+            </a:r>
+          </a:p>
+          <a:p>
+            <a:pPr marL="0" indent="0">
+              <a:buNone/>
+            </a:pPr>
+            <a:r>
+              <a:rPr lang="pt-BR" sz="1050" dirty="0"/>
+              <a:t>          ↓</a:t>
+            </a:r>
+          </a:p>
+          <a:p>
+            <a:pPr marL="0" indent="0">
+              <a:buNone/>
+            </a:pPr>
+            <a:r>
+              <a:rPr lang="pt-BR" sz="1050" dirty="0"/>
+              <a:t>+---------------------+</a:t>
+            </a:r>
+          </a:p>
+          <a:p>
+            <a:pPr marL="0" indent="0">
+              <a:buNone/>
+            </a:pPr>
+            <a:r>
+              <a:rPr lang="pt-BR" sz="1200" dirty="0"/>
+              <a:t>|     </a:t>
+            </a:r>
+            <a:r>
+              <a:rPr lang="pt-BR" sz="1200" dirty="0" err="1"/>
+              <a:t>Repository</a:t>
+            </a:r>
+            <a:r>
+              <a:rPr lang="pt-BR" sz="1200" dirty="0"/>
+              <a:t>      |  ← Camada de Persistência</a:t>
+            </a:r>
+          </a:p>
+          <a:p>
+            <a:pPr marL="0" indent="0">
+              <a:buNone/>
+            </a:pPr>
+            <a:r>
+              <a:rPr lang="pt-BR" sz="1050" dirty="0"/>
+              <a:t>|---------------------|</a:t>
+            </a:r>
+          </a:p>
+          <a:p>
+            <a:pPr marL="0" indent="0">
+              <a:buNone/>
+            </a:pPr>
+            <a:r>
+              <a:rPr lang="pt-BR" sz="1050" dirty="0"/>
+              <a:t>| </a:t>
+            </a:r>
+            <a:r>
+              <a:rPr lang="pt-BR" sz="1200" dirty="0"/>
+              <a:t>- </a:t>
+            </a:r>
+            <a:r>
+              <a:rPr lang="pt-BR" sz="1200" dirty="0" err="1"/>
+              <a:t>ClienteRepository</a:t>
+            </a:r>
+            <a:r>
+              <a:rPr lang="pt-BR" sz="1200" dirty="0"/>
+              <a:t> |</a:t>
+            </a:r>
+          </a:p>
+          <a:p>
+            <a:pPr marL="0" indent="0">
+              <a:buNone/>
+            </a:pPr>
+            <a:r>
+              <a:rPr lang="pt-BR" sz="1200" dirty="0"/>
+              <a:t>| - </a:t>
+            </a:r>
+            <a:r>
+              <a:rPr lang="pt-BR" sz="1200" dirty="0" err="1"/>
+              <a:t>RestauranteRepository</a:t>
+            </a:r>
+            <a:r>
+              <a:rPr lang="pt-BR" sz="1200" dirty="0"/>
+              <a:t> |</a:t>
+            </a:r>
+          </a:p>
+          <a:p>
+            <a:pPr marL="0" indent="0">
+              <a:buNone/>
+            </a:pPr>
+            <a:r>
+              <a:rPr lang="pt-BR" sz="1050" dirty="0"/>
+              <a:t>+---------------------+</a:t>
+            </a:r>
+          </a:p>
+          <a:p>
+            <a:pPr marL="0" indent="0">
+              <a:buNone/>
+            </a:pPr>
+            <a:r>
+              <a:rPr lang="pt-BR" sz="1050" dirty="0"/>
+              <a:t>          ↓</a:t>
+            </a:r>
+          </a:p>
+          <a:p>
+            <a:pPr marL="0" indent="0">
+              <a:buNone/>
+            </a:pPr>
+            <a:r>
+              <a:rPr lang="pt-BR" sz="1050" dirty="0"/>
+              <a:t>+---------------------+</a:t>
+            </a:r>
+          </a:p>
+          <a:p>
+            <a:pPr marL="0" indent="0">
+              <a:buNone/>
+            </a:pPr>
+            <a:r>
+              <a:rPr lang="pt-BR" sz="1200" dirty="0"/>
+              <a:t>|       Model         |  ← Entidades de Domínio</a:t>
+            </a:r>
+          </a:p>
+          <a:p>
+            <a:pPr marL="0" indent="0">
+              <a:buNone/>
+            </a:pPr>
+            <a:r>
+              <a:rPr lang="pt-BR" sz="1050" dirty="0"/>
+              <a:t>|---------------------|</a:t>
+            </a:r>
+          </a:p>
+          <a:p>
+            <a:pPr marL="0" indent="0">
+              <a:buNone/>
+            </a:pPr>
+            <a:r>
+              <a:rPr lang="pt-BR" sz="1200" dirty="0"/>
+              <a:t>| - Cliente           |</a:t>
+            </a:r>
+          </a:p>
+          <a:p>
+            <a:pPr marL="0" indent="0">
+              <a:buNone/>
+            </a:pPr>
+            <a:r>
+              <a:rPr lang="pt-BR" sz="1200" dirty="0"/>
+              <a:t>| - Restaurante       |</a:t>
+            </a:r>
+          </a:p>
+          <a:p>
+            <a:pPr marL="0" indent="0">
+              <a:buNone/>
+            </a:pPr>
+            <a:r>
+              <a:rPr lang="pt-BR" sz="1050" dirty="0"/>
+              <a:t>+---------------------+</a:t>
+            </a:r>
+          </a:p>
+          <a:p>
+            <a:endParaRPr lang="pt-BR" sz="1050" dirty="0"/>
           </a:p>
         </p:txBody>
       </p:sp>
     </p:spTree>
     <p:extLst>
       <p:ext uri="{BB962C8B-B14F-4D97-AF65-F5344CB8AC3E}">
-        <p14:creationId xmlns:p14="http://schemas.microsoft.com/office/powerpoint/2010/main" val="1757237514"/>
+        <p14:creationId xmlns:p14="http://schemas.microsoft.com/office/powerpoint/2010/main" val="1444328707"/>
       </p:ext>
     </p:extLst>
   </p:cSld>
@@ -6091,7 +6352,7 @@
           <a:graphicData uri="http://schemas.openxmlformats.org/presentationml/2006/ole">
             <mc:AlternateContent xmlns:mc="http://schemas.openxmlformats.org/markup-compatibility/2006">
               <mc:Choice xmlns:v="urn:schemas-microsoft-com:vml" Requires="v">
-                <p:oleObj spid="_x0000_s5126" name="Objeto de Shell de Gerenciador" showAsIcon="1" r:id="rId3" imgW="809708" imgH="514326" progId="Package">
+                <p:oleObj spid="_x0000_s5130" name="Objeto de Shell de Gerenciador" showAsIcon="1" r:id="rId3" imgW="809708" imgH="514326" progId="Package">
                   <p:embed/>
                 </p:oleObj>
               </mc:Choice>
@@ -6410,7 +6671,7 @@
           <p:cNvPr id="2" name="Título 1">
             <a:extLst>
               <a:ext uri="{FF2B5EF4-FFF2-40B4-BE49-F238E27FC236}">
-                <a16:creationId xmlns:a16="http://schemas.microsoft.com/office/drawing/2014/main" id="{75D91476-E09F-453B-A9FA-255014BC325B}"/>
+                <a16:creationId xmlns:a16="http://schemas.microsoft.com/office/drawing/2014/main" id="{FF502F8C-65AF-4E04-A3F4-1434C67F4F1A}"/>
               </a:ext>
             </a:extLst>
           </p:cNvPr>
@@ -6423,81 +6684,231 @@
         </p:nvSpPr>
         <p:spPr/>
         <p:txBody>
-          <a:bodyPr vert="horz" lIns="91440" tIns="45720" rIns="91440" bIns="45720" rtlCol="0" anchor="t">
-            <a:normAutofit fontScale="90000"/>
+          <a:bodyPr>
+            <a:normAutofit/>
           </a:bodyPr>
           <a:lstStyle/>
           <a:p>
             <a:r>
-              <a:rPr lang="pt-BR" sz="2800" b="1" dirty="0">
+              <a:rPr lang="pt-BR" b="1" i="0" dirty="0">
                 <a:solidFill>
                   <a:srgbClr val="0A0A0A"/>
                 </a:solidFill>
+                <a:effectLst/>
                 <a:latin typeface="Nunito" pitchFamily="2" charset="0"/>
               </a:rPr>
-              <a:t>🎯 Atividade 1: Configuração do Ambiente</a:t>
-            </a:r>
-            <a:br>
-              <a:rPr lang="pt-BR" sz="2800" b="1" dirty="0">
-                <a:solidFill>
-                  <a:srgbClr val="0A0A0A"/>
-                </a:solidFill>
+              <a:t>🎯 </a:t>
+            </a:r>
+            <a:r>
+              <a:rPr lang="pt-BR" sz="2800" b="1" i="0" dirty="0">
+                <a:solidFill>
+                  <a:schemeClr val="bg1">
+                    <a:lumMod val="50000"/>
+                  </a:schemeClr>
+                </a:solidFill>
+                <a:effectLst/>
                 <a:latin typeface="Nunito" pitchFamily="2" charset="0"/>
               </a:rPr>
-            </a:br>
-            <a:br>
-              <a:rPr lang="pt-BR" sz="2800" b="1" dirty="0">
-                <a:solidFill>
-                  <a:srgbClr val="0A0A0A"/>
-                </a:solidFill>
-                <a:latin typeface="Nunito" pitchFamily="2" charset="0"/>
-              </a:rPr>
-            </a:br>
-            <a:r>
-              <a:rPr lang="pt-BR" sz="2800" b="1" dirty="0">
-                <a:solidFill>
-                  <a:srgbClr val="0A0A0A"/>
-                </a:solidFill>
-                <a:latin typeface="Nunito" pitchFamily="2" charset="0"/>
-              </a:rPr>
-              <a:t>✅ Instalar e configurar Java JDK 21 (versão LTS mais recente)</a:t>
-            </a:r>
-          </a:p>
-        </p:txBody>
-      </p:sp>
-      <p:pic>
-        <p:nvPicPr>
-          <p:cNvPr id="6" name="Espaço Reservado para Conteúdo 5">
+              <a:t>Conceitos Aplicados</a:t>
+            </a:r>
+            <a:endParaRPr lang="pt-BR" dirty="0">
+              <a:solidFill>
+                <a:schemeClr val="bg1">
+                  <a:lumMod val="50000"/>
+                </a:schemeClr>
+              </a:solidFill>
+            </a:endParaRPr>
+          </a:p>
+        </p:txBody>
+      </p:sp>
+      <p:sp>
+        <p:nvSpPr>
+          <p:cNvPr id="3" name="Espaço Reservado para Conteúdo 2">
             <a:extLst>
               <a:ext uri="{FF2B5EF4-FFF2-40B4-BE49-F238E27FC236}">
-                <a16:creationId xmlns:a16="http://schemas.microsoft.com/office/drawing/2014/main" id="{B0500A0C-ABAF-4162-A73A-9EFA22E519BF}"/>
+                <a16:creationId xmlns:a16="http://schemas.microsoft.com/office/drawing/2014/main" id="{363A532B-3F49-4A22-A8CF-0A4FFA21DC84}"/>
               </a:ext>
             </a:extLst>
           </p:cNvPr>
-          <p:cNvPicPr>
-            <a:picLocks noGrp="1" noChangeAspect="1"/>
-          </p:cNvPicPr>
+          <p:cNvSpPr>
+            <a:spLocks noGrp="1"/>
+          </p:cNvSpPr>
           <p:nvPr>
             <p:ph idx="1"/>
           </p:nvPr>
-        </p:nvPicPr>
-        <p:blipFill>
-          <a:blip r:embed="rId2"/>
-          <a:stretch>
-            <a:fillRect/>
-          </a:stretch>
-        </p:blipFill>
-        <p:spPr>
-          <a:xfrm>
-            <a:off x="2816787" y="2286000"/>
-            <a:ext cx="6710826" cy="3581400"/>
-          </a:xfrm>
-        </p:spPr>
-      </p:pic>
+        </p:nvSpPr>
+        <p:spPr/>
+        <p:txBody>
+          <a:bodyPr>
+            <a:normAutofit/>
+          </a:bodyPr>
+          <a:lstStyle/>
+          <a:p>
+            <a:r>
+              <a:rPr lang="pt-BR" sz="1800" b="1" i="0" dirty="0">
+                <a:solidFill>
+                  <a:srgbClr val="6F7074"/>
+                </a:solidFill>
+                <a:effectLst/>
+                <a:latin typeface="Roboto" panose="02000000000000000000" pitchFamily="2" charset="0"/>
+              </a:rPr>
+              <a:t>Arquitetura em Camadas</a:t>
+            </a:r>
+            <a:r>
+              <a:rPr lang="pt-BR" sz="1800" b="0" i="0" dirty="0">
+                <a:solidFill>
+                  <a:srgbClr val="6F7074"/>
+                </a:solidFill>
+                <a:effectLst/>
+                <a:latin typeface="Roboto" panose="02000000000000000000" pitchFamily="2" charset="0"/>
+              </a:rPr>
+              <a:t>: Separação entre apresentação, negócio e persistência</a:t>
+            </a:r>
+          </a:p>
+          <a:p>
+            <a:r>
+              <a:rPr lang="pt-BR" sz="1800" b="1" i="0" dirty="0">
+                <a:solidFill>
+                  <a:srgbClr val="6F7074"/>
+                </a:solidFill>
+                <a:effectLst/>
+                <a:latin typeface="Roboto" panose="02000000000000000000" pitchFamily="2" charset="0"/>
+              </a:rPr>
+              <a:t>Padrão MVC</a:t>
+            </a:r>
+            <a:r>
+              <a:rPr lang="pt-BR" sz="1800" b="0" i="0" dirty="0">
+                <a:solidFill>
+                  <a:srgbClr val="6F7074"/>
+                </a:solidFill>
+                <a:effectLst/>
+                <a:latin typeface="Roboto" panose="02000000000000000000" pitchFamily="2" charset="0"/>
+              </a:rPr>
+              <a:t>: </a:t>
+            </a:r>
+            <a:r>
+              <a:rPr lang="pt-BR" sz="1800" b="0" i="0" dirty="0" err="1">
+                <a:solidFill>
+                  <a:srgbClr val="6F7074"/>
+                </a:solidFill>
+                <a:effectLst/>
+                <a:latin typeface="Roboto" panose="02000000000000000000" pitchFamily="2" charset="0"/>
+              </a:rPr>
+              <a:t>Controllers</a:t>
+            </a:r>
+            <a:r>
+              <a:rPr lang="pt-BR" sz="1800" b="0" i="0" dirty="0">
+                <a:solidFill>
+                  <a:srgbClr val="6F7074"/>
+                </a:solidFill>
+                <a:effectLst/>
+                <a:latin typeface="Roboto" panose="02000000000000000000" pitchFamily="2" charset="0"/>
+              </a:rPr>
+              <a:t>, Models e </a:t>
+            </a:r>
+            <a:r>
+              <a:rPr lang="pt-BR" sz="1800" b="0" i="0" dirty="0" err="1">
+                <a:solidFill>
+                  <a:srgbClr val="6F7074"/>
+                </a:solidFill>
+                <a:effectLst/>
+                <a:latin typeface="Roboto" panose="02000000000000000000" pitchFamily="2" charset="0"/>
+              </a:rPr>
+              <a:t>Views</a:t>
+            </a:r>
+            <a:r>
+              <a:rPr lang="pt-BR" sz="1800" b="0" i="0" dirty="0">
+                <a:solidFill>
+                  <a:srgbClr val="6F7074"/>
+                </a:solidFill>
+                <a:effectLst/>
+                <a:latin typeface="Roboto" panose="02000000000000000000" pitchFamily="2" charset="0"/>
+              </a:rPr>
+              <a:t> organizados</a:t>
+            </a:r>
+          </a:p>
+          <a:p>
+            <a:r>
+              <a:rPr lang="pt-BR" sz="1800" b="1" i="0" dirty="0">
+                <a:solidFill>
+                  <a:srgbClr val="6F7074"/>
+                </a:solidFill>
+                <a:effectLst/>
+                <a:latin typeface="Roboto" panose="02000000000000000000" pitchFamily="2" charset="0"/>
+              </a:rPr>
+              <a:t>Princípios SOLID</a:t>
+            </a:r>
+            <a:r>
+              <a:rPr lang="pt-BR" sz="1800" b="0" i="0" dirty="0">
+                <a:solidFill>
+                  <a:srgbClr val="6F7074"/>
+                </a:solidFill>
+                <a:effectLst/>
+                <a:latin typeface="Roboto" panose="02000000000000000000" pitchFamily="2" charset="0"/>
+              </a:rPr>
+              <a:t>: Código coeso, desacoplado e testável</a:t>
+            </a:r>
+          </a:p>
+          <a:p>
+            <a:r>
+              <a:rPr lang="pt-BR" sz="1800" b="1" i="0" dirty="0">
+                <a:solidFill>
+                  <a:srgbClr val="6F7074"/>
+                </a:solidFill>
+                <a:effectLst/>
+                <a:latin typeface="Roboto" panose="02000000000000000000" pitchFamily="2" charset="0"/>
+              </a:rPr>
+              <a:t>Clean </a:t>
+            </a:r>
+            <a:r>
+              <a:rPr lang="pt-BR" sz="1800" b="1" i="0" dirty="0" err="1">
+                <a:solidFill>
+                  <a:srgbClr val="6F7074"/>
+                </a:solidFill>
+                <a:effectLst/>
+                <a:latin typeface="Roboto" panose="02000000000000000000" pitchFamily="2" charset="0"/>
+              </a:rPr>
+              <a:t>Architecture</a:t>
+            </a:r>
+            <a:r>
+              <a:rPr lang="pt-BR" sz="1800" b="0" i="0" dirty="0">
+                <a:solidFill>
+                  <a:srgbClr val="6F7074"/>
+                </a:solidFill>
+                <a:effectLst/>
+                <a:latin typeface="Roboto" panose="02000000000000000000" pitchFamily="2" charset="0"/>
+              </a:rPr>
+              <a:t>: Estrutura modular e independente de frameworks</a:t>
+            </a:r>
+          </a:p>
+          <a:p>
+            <a:r>
+              <a:rPr lang="pt-BR" sz="1800" b="1" i="0" dirty="0">
+                <a:solidFill>
+                  <a:srgbClr val="6F7074"/>
+                </a:solidFill>
+                <a:effectLst/>
+                <a:latin typeface="Roboto" panose="02000000000000000000" pitchFamily="2" charset="0"/>
+              </a:rPr>
+              <a:t>Documentação Arquitetural</a:t>
+            </a:r>
+            <a:r>
+              <a:rPr lang="pt-BR" sz="1800" b="0" i="0" dirty="0">
+                <a:solidFill>
+                  <a:srgbClr val="6F7074"/>
+                </a:solidFill>
+                <a:effectLst/>
+                <a:latin typeface="Roboto" panose="02000000000000000000" pitchFamily="2" charset="0"/>
+              </a:rPr>
+              <a:t>: Diagrama UML e justificativas técnicas</a:t>
+            </a:r>
+          </a:p>
+        </p:txBody>
+      </p:sp>
     </p:spTree>
     <p:extLst>
       <p:ext uri="{BB962C8B-B14F-4D97-AF65-F5344CB8AC3E}">
-        <p14:creationId xmlns:p14="http://schemas.microsoft.com/office/powerpoint/2010/main" val="1444328707"/>
+        <p14:creationId xmlns:p14="http://schemas.microsoft.com/office/powerpoint/2010/main" val="1757237514"/>
       </p:ext>
     </p:extLst>
   </p:cSld>
@@ -7054,7 +7465,7 @@
           <a:graphicData uri="http://schemas.openxmlformats.org/presentationml/2006/ole">
             <mc:AlternateContent xmlns:mc="http://schemas.openxmlformats.org/markup-compatibility/2006">
               <mc:Choice xmlns:v="urn:schemas-microsoft-com:vml" Requires="v">
-                <p:oleObj spid="_x0000_s1030" name="Objeto de Shell de Gerenciador" showAsIcon="1" r:id="rId3" imgW="962071" imgH="514326" progId="Package">
+                <p:oleObj spid="_x0000_s1034" name="Objeto de Shell de Gerenciador" showAsIcon="1" r:id="rId3" imgW="962071" imgH="514326" progId="Package">
                   <p:embed/>
                 </p:oleObj>
               </mc:Choice>

</xml_diff>